<commit_message>
Final Design PowerPoint Update
</commit_message>
<xml_diff>
--- a/Design Documents/PresentationSoft_latest version.pptx
+++ b/Design Documents/PresentationSoft_latest version.pptx
@@ -15,12 +15,11 @@
     <p:sldId id="273" r:id="rId9"/>
     <p:sldId id="277" r:id="rId10"/>
     <p:sldId id="278" r:id="rId11"/>
-    <p:sldId id="279" r:id="rId12"/>
-    <p:sldId id="276" r:id="rId13"/>
-    <p:sldId id="275" r:id="rId14"/>
-    <p:sldId id="280" r:id="rId15"/>
-    <p:sldId id="281" r:id="rId16"/>
-    <p:sldId id="267" r:id="rId17"/>
+    <p:sldId id="276" r:id="rId12"/>
+    <p:sldId id="275" r:id="rId13"/>
+    <p:sldId id="280" r:id="rId14"/>
+    <p:sldId id="281" r:id="rId15"/>
+    <p:sldId id="267" r:id="rId16"/>
   </p:sldIdLst>
   <p:sldSz cx="9144000" cy="6858000" type="screen4x3"/>
   <p:notesSz cx="6858000" cy="9144000"/>
@@ -4919,7 +4918,10 @@
           <a:bodyPr/>
           <a:lstStyle/>
           <a:p>
-            <a:endParaRPr lang="en-US"/>
+            <a:r>
+              <a:rPr lang="en-US" dirty="0"/>
+              <a:t>Main Tables</a:t>
+            </a:r>
           </a:p>
         </p:txBody>
       </p:sp>
@@ -4997,85 +4999,10 @@
           <a:bodyPr/>
           <a:lstStyle/>
           <a:p>
-            <a:endParaRPr lang="en-US"/>
-          </a:p>
-        </p:txBody>
-      </p:sp>
-      <p:pic>
-        <p:nvPicPr>
-          <p:cNvPr id="4" name="Content Placeholder 3"/>
-          <p:cNvPicPr>
-            <a:picLocks noGrp="1" noChangeAspect="1"/>
-          </p:cNvPicPr>
-          <p:nvPr>
-            <p:ph idx="1"/>
-          </p:nvPr>
-        </p:nvPicPr>
-        <p:blipFill>
-          <a:blip r:embed="rId2" cstate="email">
-            <a:extLst>
-              <a:ext uri="{28A0092B-C50C-407E-A947-70E740481C1C}">
-                <a14:useLocalDpi xmlns:a14="http://schemas.microsoft.com/office/drawing/2010/main" val="0"/>
-              </a:ext>
-            </a:extLst>
-          </a:blip>
-          <a:stretch>
-            <a:fillRect/>
-          </a:stretch>
-        </p:blipFill>
-        <p:spPr>
-          <a:xfrm>
-            <a:off x="3557003" y="1100138"/>
-            <a:ext cx="2052219" cy="3579812"/>
-          </a:xfrm>
-        </p:spPr>
-      </p:pic>
-    </p:spTree>
-    <p:extLst>
-      <p:ext uri="{BB962C8B-B14F-4D97-AF65-F5344CB8AC3E}">
-        <p14:creationId xmlns:p14="http://schemas.microsoft.com/office/powerpoint/2010/main" val="3334485875"/>
-      </p:ext>
-    </p:extLst>
-  </p:cSld>
-  <p:clrMapOvr>
-    <a:masterClrMapping/>
-  </p:clrMapOvr>
-</p:sld>
-</file>
-
-<file path=ppt/slides/slide12.xml><?xml version="1.0" encoding="utf-8"?>
-<p:sld xmlns:a="http://schemas.openxmlformats.org/drawingml/2006/main" xmlns:r="http://schemas.openxmlformats.org/officeDocument/2006/relationships" xmlns:p="http://schemas.openxmlformats.org/presentationml/2006/main">
-  <p:cSld>
-    <p:spTree>
-      <p:nvGrpSpPr>
-        <p:cNvPr id="1" name=""/>
-        <p:cNvGrpSpPr/>
-        <p:nvPr/>
-      </p:nvGrpSpPr>
-      <p:grpSpPr>
-        <a:xfrm>
-          <a:off x="0" y="0"/>
-          <a:ext cx="0" cy="0"/>
-          <a:chOff x="0" y="0"/>
-          <a:chExt cx="0" cy="0"/>
-        </a:xfrm>
-      </p:grpSpPr>
-      <p:sp>
-        <p:nvSpPr>
-          <p:cNvPr id="2" name="Title 1"/>
-          <p:cNvSpPr>
-            <a:spLocks noGrp="1"/>
-          </p:cNvSpPr>
-          <p:nvPr>
-            <p:ph type="title"/>
-          </p:nvPr>
-        </p:nvSpPr>
-        <p:spPr/>
-        <p:txBody>
-          <a:bodyPr/>
-          <a:lstStyle/>
-          <a:p>
-            <a:endParaRPr lang="en-US"/>
+            <a:r>
+              <a:rPr lang="en-US" dirty="0"/>
+              <a:t>Menu Groups</a:t>
+            </a:r>
           </a:p>
         </p:txBody>
       </p:sp>
@@ -5122,6 +5049,87 @@
 </p:sld>
 </file>
 
+<file path=ppt/slides/slide12.xml><?xml version="1.0" encoding="utf-8"?>
+<p:sld xmlns:a="http://schemas.openxmlformats.org/drawingml/2006/main" xmlns:r="http://schemas.openxmlformats.org/officeDocument/2006/relationships" xmlns:p="http://schemas.openxmlformats.org/presentationml/2006/main">
+  <p:cSld>
+    <p:spTree>
+      <p:nvGrpSpPr>
+        <p:cNvPr id="1" name=""/>
+        <p:cNvGrpSpPr/>
+        <p:nvPr/>
+      </p:nvGrpSpPr>
+      <p:grpSpPr>
+        <a:xfrm>
+          <a:off x="0" y="0"/>
+          <a:ext cx="0" cy="0"/>
+          <a:chOff x="0" y="0"/>
+          <a:chExt cx="0" cy="0"/>
+        </a:xfrm>
+      </p:grpSpPr>
+      <p:sp>
+        <p:nvSpPr>
+          <p:cNvPr id="3" name="Title 2"/>
+          <p:cNvSpPr>
+            <a:spLocks noGrp="1"/>
+          </p:cNvSpPr>
+          <p:nvPr>
+            <p:ph type="title"/>
+          </p:nvPr>
+        </p:nvSpPr>
+        <p:spPr/>
+        <p:txBody>
+          <a:bodyPr/>
+          <a:lstStyle/>
+          <a:p>
+            <a:r>
+              <a:rPr lang="en-US" dirty="0"/>
+              <a:t>Menu Items</a:t>
+            </a:r>
+          </a:p>
+        </p:txBody>
+      </p:sp>
+      <p:pic>
+        <p:nvPicPr>
+          <p:cNvPr id="6" name="Content Placeholder 5"/>
+          <p:cNvPicPr>
+            <a:picLocks noGrp="1" noChangeAspect="1"/>
+          </p:cNvPicPr>
+          <p:nvPr>
+            <p:ph idx="1"/>
+          </p:nvPr>
+        </p:nvPicPr>
+        <p:blipFill>
+          <a:blip r:embed="rId2" cstate="email">
+            <a:extLst>
+              <a:ext uri="{28A0092B-C50C-407E-A947-70E740481C1C}">
+                <a14:useLocalDpi xmlns:a14="http://schemas.microsoft.com/office/drawing/2010/main" val="0"/>
+              </a:ext>
+            </a:extLst>
+          </a:blip>
+          <a:stretch>
+            <a:fillRect/>
+          </a:stretch>
+        </p:blipFill>
+        <p:spPr>
+          <a:xfrm>
+            <a:off x="1290098" y="1172777"/>
+            <a:ext cx="6586029" cy="3434533"/>
+          </a:xfrm>
+        </p:spPr>
+      </p:pic>
+    </p:spTree>
+    <p:extLst>
+      <p:ext uri="{BB962C8B-B14F-4D97-AF65-F5344CB8AC3E}">
+        <p14:creationId xmlns:p14="http://schemas.microsoft.com/office/powerpoint/2010/main" val="2784569616"/>
+      </p:ext>
+    </p:extLst>
+  </p:cSld>
+  <p:clrMapOvr>
+    <a:masterClrMapping/>
+  </p:clrMapOvr>
+</p:sld>
+</file>
+
 <file path=ppt/slides/slide13.xml><?xml version="1.0" encoding="utf-8"?>
 <p:sld xmlns:a="http://schemas.openxmlformats.org/drawingml/2006/main" xmlns:r="http://schemas.openxmlformats.org/officeDocument/2006/relationships" xmlns:p="http://schemas.openxmlformats.org/presentationml/2006/main">
   <p:cSld>
@@ -5139,66 +5147,6 @@
           <a:chExt cx="0" cy="0"/>
         </a:xfrm>
       </p:grpSpPr>
-      <p:pic>
-        <p:nvPicPr>
-          <p:cNvPr id="4" name="Content Placeholder 3" descr="OpenMenu Menu Items - Hierarchical - Functional Dependency.png"/>
-          <p:cNvPicPr>
-            <a:picLocks noGrp="1" noChangeAspect="1"/>
-          </p:cNvPicPr>
-          <p:nvPr>
-            <p:ph idx="1"/>
-          </p:nvPr>
-        </p:nvPicPr>
-        <p:blipFill>
-          <a:blip r:embed="rId2" cstate="email">
-            <a:extLst>
-              <a:ext uri="{28A0092B-C50C-407E-A947-70E740481C1C}">
-                <a14:useLocalDpi xmlns:a14="http://schemas.microsoft.com/office/drawing/2010/main" val="0"/>
-              </a:ext>
-            </a:extLst>
-          </a:blip>
-          <a:srcRect l="-4780" r="-4780"/>
-          <a:stretch>
-            <a:fillRect/>
-          </a:stretch>
-        </p:blipFill>
-        <p:spPr>
-          <a:xfrm>
-            <a:off x="0" y="214441"/>
-            <a:ext cx="9144000" cy="4352400"/>
-          </a:xfrm>
-        </p:spPr>
-      </p:pic>
-    </p:spTree>
-    <p:extLst>
-      <p:ext uri="{BB962C8B-B14F-4D97-AF65-F5344CB8AC3E}">
-        <p14:creationId xmlns:p14="http://schemas.microsoft.com/office/powerpoint/2010/main" val="2784569616"/>
-      </p:ext>
-    </p:extLst>
-  </p:cSld>
-  <p:clrMapOvr>
-    <a:masterClrMapping/>
-  </p:clrMapOvr>
-</p:sld>
-</file>
-
-<file path=ppt/slides/slide14.xml><?xml version="1.0" encoding="utf-8"?>
-<p:sld xmlns:a="http://schemas.openxmlformats.org/drawingml/2006/main" xmlns:r="http://schemas.openxmlformats.org/officeDocument/2006/relationships" xmlns:p="http://schemas.openxmlformats.org/presentationml/2006/main">
-  <p:cSld>
-    <p:spTree>
-      <p:nvGrpSpPr>
-        <p:cNvPr id="1" name=""/>
-        <p:cNvGrpSpPr/>
-        <p:nvPr/>
-      </p:nvGrpSpPr>
-      <p:grpSpPr>
-        <a:xfrm>
-          <a:off x="0" y="0"/>
-          <a:ext cx="0" cy="0"/>
-          <a:chOff x="0" y="0"/>
-          <a:chExt cx="0" cy="0"/>
-        </a:xfrm>
-      </p:grpSpPr>
       <p:sp>
         <p:nvSpPr>
           <p:cNvPr id="2" name="Title 1"/>
@@ -5214,7 +5162,10 @@
           <a:bodyPr/>
           <a:lstStyle/>
           <a:p>
-            <a:endParaRPr lang="en-US"/>
+            <a:r>
+              <a:rPr lang="en-US" dirty="0"/>
+              <a:t>Restaurant Information - Primary</a:t>
+            </a:r>
           </a:p>
         </p:txBody>
       </p:sp>
@@ -5260,7 +5211,7 @@
 </p:sld>
 </file>
 
-<file path=ppt/slides/slide15.xml><?xml version="1.0" encoding="utf-8"?>
+<file path=ppt/slides/slide14.xml><?xml version="1.0" encoding="utf-8"?>
 <p:sld xmlns:a="http://schemas.openxmlformats.org/drawingml/2006/main" xmlns:r="http://schemas.openxmlformats.org/officeDocument/2006/relationships" xmlns:p="http://schemas.openxmlformats.org/presentationml/2006/main">
   <p:cSld>
     <p:spTree>
@@ -5292,7 +5243,10 @@
           <a:bodyPr/>
           <a:lstStyle/>
           <a:p>
-            <a:endParaRPr lang="en-US"/>
+            <a:r>
+              <a:rPr lang="en-US" dirty="0"/>
+              <a:t>Restaurant Information - Dependent</a:t>
+            </a:r>
           </a:p>
         </p:txBody>
       </p:sp>
@@ -5338,7 +5292,7 @@
 </p:sld>
 </file>
 
-<file path=ppt/slides/slide16.xml><?xml version="1.0" encoding="utf-8"?>
+<file path=ppt/slides/slide15.xml><?xml version="1.0" encoding="utf-8"?>
 <p:sld xmlns:a="http://schemas.openxmlformats.org/drawingml/2006/main" xmlns:r="http://schemas.openxmlformats.org/officeDocument/2006/relationships" xmlns:p="http://schemas.openxmlformats.org/presentationml/2006/main">
   <p:cSld>
     <p:spTree>
@@ -5656,7 +5610,6 @@
               <a:rPr lang="en-US" dirty="0"/>
               <a:t>- Restaurant owner may wish to invest in dedicated IT personnel to perform regular basic maintenance duties.</a:t>
             </a:r>
-            <a:endParaRPr lang="en-US" dirty="0"/>
           </a:p>
         </p:txBody>
       </p:sp>
@@ -6110,7 +6063,10 @@
           <a:bodyPr/>
           <a:lstStyle/>
           <a:p>
-            <a:endParaRPr lang="en-US"/>
+            <a:r>
+              <a:rPr lang="en-US" dirty="0"/>
+              <a:t>Database Schema Overview</a:t>
+            </a:r>
           </a:p>
         </p:txBody>
       </p:sp>

</xml_diff>